<commit_message>
change game name from gamePunchinBall to gameMenu
</commit_message>
<xml_diff>
--- a/images/levels.pptx
+++ b/images/levels.pptx
@@ -5,7 +5,7 @@
     <p:sldMasterId id="2147483648" r:id="rId1"/>
   </p:sldMasterIdLst>
   <p:notesMasterIdLst>
-    <p:notesMasterId r:id="rId10"/>
+    <p:notesMasterId r:id="rId12"/>
   </p:notesMasterIdLst>
   <p:sldIdLst>
     <p:sldId id="256" r:id="rId2"/>
@@ -16,6 +16,8 @@
     <p:sldId id="257" r:id="rId7"/>
     <p:sldId id="260" r:id="rId8"/>
     <p:sldId id="261" r:id="rId9"/>
+    <p:sldId id="266" r:id="rId10"/>
+    <p:sldId id="267" r:id="rId11"/>
   </p:sldIdLst>
   <p:sldSz cx="12192000" cy="6858000"/>
   <p:notesSz cx="6858000" cy="9144000"/>
@@ -204,7 +206,7 @@
           <a:p>
             <a:fld id="{6361375E-3336-9A41-BC99-C524FEB5B14A}" type="datetimeFigureOut">
               <a:rPr lang="en-US" smtClean="0"/>
-              <a:t>7/11/17</a:t>
+              <a:t>7/13/17</a:t>
             </a:fld>
             <a:endParaRPr lang="en-US"/>
           </a:p>
@@ -603,7 +605,7 @@
           <a:p>
             <a:fld id="{D970CA57-0358-1142-B201-E44A3C60D7B5}" type="datetimeFigureOut">
               <a:rPr lang="en-US" smtClean="0"/>
-              <a:t>7/11/17</a:t>
+              <a:t>7/13/17</a:t>
             </a:fld>
             <a:endParaRPr lang="en-US"/>
           </a:p>
@@ -773,7 +775,7 @@
           <a:p>
             <a:fld id="{D970CA57-0358-1142-B201-E44A3C60D7B5}" type="datetimeFigureOut">
               <a:rPr lang="en-US" smtClean="0"/>
-              <a:t>7/11/17</a:t>
+              <a:t>7/13/17</a:t>
             </a:fld>
             <a:endParaRPr lang="en-US"/>
           </a:p>
@@ -953,7 +955,7 @@
           <a:p>
             <a:fld id="{D970CA57-0358-1142-B201-E44A3C60D7B5}" type="datetimeFigureOut">
               <a:rPr lang="en-US" smtClean="0"/>
-              <a:t>7/11/17</a:t>
+              <a:t>7/13/17</a:t>
             </a:fld>
             <a:endParaRPr lang="en-US"/>
           </a:p>
@@ -1123,7 +1125,7 @@
           <a:p>
             <a:fld id="{D970CA57-0358-1142-B201-E44A3C60D7B5}" type="datetimeFigureOut">
               <a:rPr lang="en-US" smtClean="0"/>
-              <a:t>7/11/17</a:t>
+              <a:t>7/13/17</a:t>
             </a:fld>
             <a:endParaRPr lang="en-US"/>
           </a:p>
@@ -1369,7 +1371,7 @@
           <a:p>
             <a:fld id="{D970CA57-0358-1142-B201-E44A3C60D7B5}" type="datetimeFigureOut">
               <a:rPr lang="en-US" smtClean="0"/>
-              <a:t>7/11/17</a:t>
+              <a:t>7/13/17</a:t>
             </a:fld>
             <a:endParaRPr lang="en-US"/>
           </a:p>
@@ -1601,7 +1603,7 @@
           <a:p>
             <a:fld id="{D970CA57-0358-1142-B201-E44A3C60D7B5}" type="datetimeFigureOut">
               <a:rPr lang="en-US" smtClean="0"/>
-              <a:t>7/11/17</a:t>
+              <a:t>7/13/17</a:t>
             </a:fld>
             <a:endParaRPr lang="en-US"/>
           </a:p>
@@ -1968,7 +1970,7 @@
           <a:p>
             <a:fld id="{D970CA57-0358-1142-B201-E44A3C60D7B5}" type="datetimeFigureOut">
               <a:rPr lang="en-US" smtClean="0"/>
-              <a:t>7/11/17</a:t>
+              <a:t>7/13/17</a:t>
             </a:fld>
             <a:endParaRPr lang="en-US"/>
           </a:p>
@@ -2086,7 +2088,7 @@
           <a:p>
             <a:fld id="{D970CA57-0358-1142-B201-E44A3C60D7B5}" type="datetimeFigureOut">
               <a:rPr lang="en-US" smtClean="0"/>
-              <a:t>7/11/17</a:t>
+              <a:t>7/13/17</a:t>
             </a:fld>
             <a:endParaRPr lang="en-US"/>
           </a:p>
@@ -2181,7 +2183,7 @@
           <a:p>
             <a:fld id="{D970CA57-0358-1142-B201-E44A3C60D7B5}" type="datetimeFigureOut">
               <a:rPr lang="en-US" smtClean="0"/>
-              <a:t>7/11/17</a:t>
+              <a:t>7/13/17</a:t>
             </a:fld>
             <a:endParaRPr lang="en-US"/>
           </a:p>
@@ -2458,7 +2460,7 @@
           <a:p>
             <a:fld id="{D970CA57-0358-1142-B201-E44A3C60D7B5}" type="datetimeFigureOut">
               <a:rPr lang="en-US" smtClean="0"/>
-              <a:t>7/11/17</a:t>
+              <a:t>7/13/17</a:t>
             </a:fld>
             <a:endParaRPr lang="en-US"/>
           </a:p>
@@ -2711,7 +2713,7 @@
           <a:p>
             <a:fld id="{D970CA57-0358-1142-B201-E44A3C60D7B5}" type="datetimeFigureOut">
               <a:rPr lang="en-US" smtClean="0"/>
-              <a:t>7/11/17</a:t>
+              <a:t>7/13/17</a:t>
             </a:fld>
             <a:endParaRPr lang="en-US"/>
           </a:p>
@@ -2924,7 +2926,7 @@
           <a:p>
             <a:fld id="{D970CA57-0358-1142-B201-E44A3C60D7B5}" type="datetimeFigureOut">
               <a:rPr lang="en-US" smtClean="0"/>
-              <a:t>7/11/17</a:t>
+              <a:t>7/13/17</a:t>
             </a:fld>
             <a:endParaRPr lang="en-US"/>
           </a:p>
@@ -3776,6 +3778,74 @@
 </p:sld>
 </file>
 
+<file path=ppt/slides/slide10.xml><?xml version="1.0" encoding="utf-8"?>
+<p:sld xmlns:a="http://schemas.openxmlformats.org/drawingml/2006/main" xmlns:r="http://schemas.openxmlformats.org/officeDocument/2006/relationships" xmlns:p="http://schemas.openxmlformats.org/presentationml/2006/main">
+  <p:cSld>
+    <p:spTree>
+      <p:nvGrpSpPr>
+        <p:cNvPr id="1" name=""/>
+        <p:cNvGrpSpPr/>
+        <p:nvPr/>
+      </p:nvGrpSpPr>
+      <p:grpSpPr>
+        <a:xfrm>
+          <a:off x="0" y="0"/>
+          <a:ext cx="0" cy="0"/>
+          <a:chOff x="0" y="0"/>
+          <a:chExt cx="0" cy="0"/>
+        </a:xfrm>
+      </p:grpSpPr>
+      <p:sp>
+        <p:nvSpPr>
+          <p:cNvPr id="2" name="Title 1"/>
+          <p:cNvSpPr>
+            <a:spLocks noGrp="1"/>
+          </p:cNvSpPr>
+          <p:nvPr>
+            <p:ph type="title"/>
+          </p:nvPr>
+        </p:nvSpPr>
+        <p:spPr/>
+        <p:txBody>
+          <a:bodyPr/>
+          <a:lstStyle/>
+          <a:p>
+            <a:endParaRPr lang="en-US"/>
+          </a:p>
+        </p:txBody>
+      </p:sp>
+      <p:sp>
+        <p:nvSpPr>
+          <p:cNvPr id="3" name="Content Placeholder 2"/>
+          <p:cNvSpPr>
+            <a:spLocks noGrp="1"/>
+          </p:cNvSpPr>
+          <p:nvPr>
+            <p:ph idx="1"/>
+          </p:nvPr>
+        </p:nvSpPr>
+        <p:spPr/>
+        <p:txBody>
+          <a:bodyPr/>
+          <a:lstStyle/>
+          <a:p>
+            <a:endParaRPr lang="en-US"/>
+          </a:p>
+        </p:txBody>
+      </p:sp>
+    </p:spTree>
+    <p:extLst>
+      <p:ext uri="{BB962C8B-B14F-4D97-AF65-F5344CB8AC3E}">
+        <p14:creationId xmlns:p14="http://schemas.microsoft.com/office/powerpoint/2010/main" val="1193336055"/>
+      </p:ext>
+    </p:extLst>
+  </p:cSld>
+  <p:clrMapOvr>
+    <a:masterClrMapping/>
+  </p:clrMapOvr>
+</p:sld>
+</file>
+
 <file path=ppt/slides/slide2.xml><?xml version="1.0" encoding="utf-8"?>
 <p:sld xmlns:a="http://schemas.openxmlformats.org/drawingml/2006/main" xmlns:r="http://schemas.openxmlformats.org/officeDocument/2006/relationships" xmlns:p="http://schemas.openxmlformats.org/presentationml/2006/main">
   <p:cSld>
@@ -3905,23 +3975,7 @@
                 <a:ea typeface="Arial Rounded MT Bold" charset="0"/>
                 <a:cs typeface="Arial Rounded MT Bold" charset="0"/>
               </a:rPr>
-              <a:t>APPUYEZ SUR 2 POUR </a:t>
-            </a:r>
-            <a:r>
-              <a:rPr lang="en-US" sz="1200" b="1" dirty="0" smtClean="0">
-                <a:ln>
-                  <a:solidFill>
-                    <a:schemeClr val="tx1"/>
-                  </a:solidFill>
-                </a:ln>
-                <a:solidFill>
-                  <a:schemeClr val="bg1"/>
-                </a:solidFill>
-                <a:latin typeface="Arial Rounded MT Bold" charset="0"/>
-                <a:ea typeface="Arial Rounded MT Bold" charset="0"/>
-                <a:cs typeface="Arial Rounded MT Bold" charset="0"/>
-              </a:rPr>
-              <a:t>VOLER</a:t>
+              <a:t>APPUYEZ SUR 2 POUR VOLER</a:t>
             </a:r>
           </a:p>
           <a:p>
@@ -5411,6 +5465,202 @@
     <p:extLst>
       <p:ext uri="{BB962C8B-B14F-4D97-AF65-F5344CB8AC3E}">
         <p14:creationId xmlns:p14="http://schemas.microsoft.com/office/powerpoint/2010/main" val="1168859420"/>
+      </p:ext>
+    </p:extLst>
+  </p:cSld>
+  <p:clrMapOvr>
+    <a:masterClrMapping/>
+  </p:clrMapOvr>
+</p:sld>
+</file>
+
+<file path=ppt/slides/slide9.xml><?xml version="1.0" encoding="utf-8"?>
+<p:sld xmlns:a="http://schemas.openxmlformats.org/drawingml/2006/main" xmlns:r="http://schemas.openxmlformats.org/officeDocument/2006/relationships" xmlns:p="http://schemas.openxmlformats.org/presentationml/2006/main">
+  <p:cSld>
+    <p:spTree>
+      <p:nvGrpSpPr>
+        <p:cNvPr id="1" name=""/>
+        <p:cNvGrpSpPr/>
+        <p:nvPr/>
+      </p:nvGrpSpPr>
+      <p:grpSpPr>
+        <a:xfrm>
+          <a:off x="0" y="0"/>
+          <a:ext cx="0" cy="0"/>
+          <a:chOff x="0" y="0"/>
+          <a:chExt cx="0" cy="0"/>
+        </a:xfrm>
+      </p:grpSpPr>
+      <p:sp>
+        <p:nvSpPr>
+          <p:cNvPr id="4" name="Rectangle 3"/>
+          <p:cNvSpPr/>
+          <p:nvPr/>
+        </p:nvSpPr>
+        <p:spPr>
+          <a:xfrm>
+            <a:off x="3492708" y="1334125"/>
+            <a:ext cx="2473377" cy="1244183"/>
+          </a:xfrm>
+          <a:prstGeom prst="rect">
+            <a:avLst/>
+          </a:prstGeom>
+        </p:spPr>
+        <p:style>
+          <a:lnRef idx="2">
+            <a:schemeClr val="accent1">
+              <a:shade val="50000"/>
+            </a:schemeClr>
+          </a:lnRef>
+          <a:fillRef idx="1">
+            <a:schemeClr val="accent1"/>
+          </a:fillRef>
+          <a:effectRef idx="0">
+            <a:schemeClr val="accent1"/>
+          </a:effectRef>
+          <a:fontRef idx="minor">
+            <a:schemeClr val="lt1"/>
+          </a:fontRef>
+        </p:style>
+        <p:txBody>
+          <a:bodyPr rtlCol="0" anchor="ctr"/>
+          <a:lstStyle/>
+          <a:p>
+            <a:pPr algn="ctr"/>
+            <a:endParaRPr lang="en-US"/>
+          </a:p>
+        </p:txBody>
+      </p:sp>
+      <p:sp>
+        <p:nvSpPr>
+          <p:cNvPr id="2" name="Rectangle 1"/>
+          <p:cNvSpPr/>
+          <p:nvPr/>
+        </p:nvSpPr>
+        <p:spPr>
+          <a:xfrm>
+            <a:off x="3048000" y="2828836"/>
+            <a:ext cx="6096000" cy="1200329"/>
+          </a:xfrm>
+          <a:prstGeom prst="rect">
+            <a:avLst/>
+          </a:prstGeom>
+        </p:spPr>
+        <p:txBody>
+          <a:bodyPr>
+            <a:spAutoFit/>
+          </a:bodyPr>
+          <a:lstStyle/>
+          <a:p>
+            <a:r>
+              <a:rPr lang="en-US" dirty="0"/>
+              <a:t>1. Pour </a:t>
+            </a:r>
+            <a:r>
+              <a:rPr lang="en-US" dirty="0" err="1"/>
+              <a:t>quel</a:t>
+            </a:r>
+            <a:r>
+              <a:rPr lang="en-US" dirty="0"/>
+              <a:t> </a:t>
+            </a:r>
+            <a:r>
+              <a:rPr lang="en-US" dirty="0" err="1"/>
+              <a:t>pourcentage</a:t>
+            </a:r>
+            <a:r>
+              <a:rPr lang="en-US" dirty="0"/>
+              <a:t> de </a:t>
+            </a:r>
+            <a:r>
+              <a:rPr lang="en-US" dirty="0" err="1"/>
+              <a:t>votre</a:t>
+            </a:r>
+            <a:r>
+              <a:rPr lang="en-US" dirty="0"/>
+              <a:t> temps </a:t>
+            </a:r>
+            <a:r>
+              <a:rPr lang="en-US" dirty="0" err="1"/>
+              <a:t>éveillé</a:t>
+            </a:r>
+            <a:r>
+              <a:rPr lang="en-US" dirty="0"/>
+              <a:t> </a:t>
+            </a:r>
+            <a:r>
+              <a:rPr lang="en-US" dirty="0" err="1"/>
+              <a:t>étiez-vous</a:t>
+            </a:r>
+            <a:r>
+              <a:rPr lang="en-US" dirty="0"/>
+              <a:t> </a:t>
+            </a:r>
+            <a:r>
+              <a:rPr lang="en-US" dirty="0" err="1"/>
+              <a:t>conscient</a:t>
+            </a:r>
+            <a:r>
+              <a:rPr lang="en-US" dirty="0"/>
+              <a:t> de </a:t>
+            </a:r>
+            <a:r>
+              <a:rPr lang="en-US" dirty="0" err="1"/>
+              <a:t>vos</a:t>
+            </a:r>
+            <a:r>
+              <a:rPr lang="en-US" dirty="0"/>
+              <a:t> </a:t>
+            </a:r>
+            <a:r>
+              <a:rPr lang="en-US" dirty="0" err="1"/>
+              <a:t>acouphènes</a:t>
+            </a:r>
+            <a:r>
+              <a:rPr lang="en-US" dirty="0"/>
+              <a:t>?</a:t>
+            </a:r>
+          </a:p>
+          <a:p>
+            <a:r>
+              <a:rPr lang="en-US" dirty="0" err="1"/>
+              <a:t>Jamais</a:t>
+            </a:r>
+            <a:r>
+              <a:rPr lang="en-US" dirty="0"/>
+              <a:t> </a:t>
+            </a:r>
+            <a:r>
+              <a:rPr lang="en-US" dirty="0" err="1"/>
+              <a:t>conscient</a:t>
+            </a:r>
+            <a:r>
+              <a:rPr lang="en-US" dirty="0"/>
+              <a:t> 0% 10% 20% 30% 40% 50% 60% 70% 80% 90% 100% </a:t>
+            </a:r>
+            <a:r>
+              <a:rPr lang="en-US" dirty="0" err="1"/>
+              <a:t>Conscient</a:t>
+            </a:r>
+            <a:r>
+              <a:rPr lang="en-US" dirty="0"/>
+              <a:t> </a:t>
+            </a:r>
+            <a:r>
+              <a:rPr lang="en-US" dirty="0" err="1"/>
+              <a:t>en</a:t>
+            </a:r>
+            <a:r>
+              <a:rPr lang="en-US"/>
+              <a:t> permanence</a:t>
+            </a:r>
+          </a:p>
+        </p:txBody>
+      </p:sp>
+    </p:spTree>
+    <p:extLst>
+      <p:ext uri="{BB962C8B-B14F-4D97-AF65-F5344CB8AC3E}">
+        <p14:creationId xmlns:p14="http://schemas.microsoft.com/office/powerpoint/2010/main" val="1243942800"/>
       </p:ext>
     </p:extLst>
   </p:cSld>

</xml_diff>